<commit_message>
Update code and files
</commit_message>
<xml_diff>
--- a/Figures.pptx
+++ b/Figures.pptx
@@ -263,7 +263,7 @@
           <a:p>
             <a:fld id="{6DC748ED-5CF5-CD4C-9FF2-B9B7ABFF9505}" type="datetimeFigureOut">
               <a:rPr kumimoji="1" lang="zh-CN" altLang="en-US" smtClean="0"/>
-              <a:t>2023/8/14</a:t>
+              <a:t>2023/12/6</a:t>
             </a:fld>
             <a:endParaRPr kumimoji="1" lang="zh-CN" altLang="en-US"/>
           </a:p>
@@ -461,7 +461,7 @@
           <a:p>
             <a:fld id="{6DC748ED-5CF5-CD4C-9FF2-B9B7ABFF9505}" type="datetimeFigureOut">
               <a:rPr kumimoji="1" lang="zh-CN" altLang="en-US" smtClean="0"/>
-              <a:t>2023/8/14</a:t>
+              <a:t>2023/12/6</a:t>
             </a:fld>
             <a:endParaRPr kumimoji="1" lang="zh-CN" altLang="en-US"/>
           </a:p>
@@ -669,7 +669,7 @@
           <a:p>
             <a:fld id="{6DC748ED-5CF5-CD4C-9FF2-B9B7ABFF9505}" type="datetimeFigureOut">
               <a:rPr kumimoji="1" lang="zh-CN" altLang="en-US" smtClean="0"/>
-              <a:t>2023/8/14</a:t>
+              <a:t>2023/12/6</a:t>
             </a:fld>
             <a:endParaRPr kumimoji="1" lang="zh-CN" altLang="en-US"/>
           </a:p>
@@ -867,7 +867,7 @@
           <a:p>
             <a:fld id="{6DC748ED-5CF5-CD4C-9FF2-B9B7ABFF9505}" type="datetimeFigureOut">
               <a:rPr kumimoji="1" lang="zh-CN" altLang="en-US" smtClean="0"/>
-              <a:t>2023/8/14</a:t>
+              <a:t>2023/12/6</a:t>
             </a:fld>
             <a:endParaRPr kumimoji="1" lang="zh-CN" altLang="en-US"/>
           </a:p>
@@ -1142,7 +1142,7 @@
           <a:p>
             <a:fld id="{6DC748ED-5CF5-CD4C-9FF2-B9B7ABFF9505}" type="datetimeFigureOut">
               <a:rPr kumimoji="1" lang="zh-CN" altLang="en-US" smtClean="0"/>
-              <a:t>2023/8/14</a:t>
+              <a:t>2023/12/6</a:t>
             </a:fld>
             <a:endParaRPr kumimoji="1" lang="zh-CN" altLang="en-US"/>
           </a:p>
@@ -1407,7 +1407,7 @@
           <a:p>
             <a:fld id="{6DC748ED-5CF5-CD4C-9FF2-B9B7ABFF9505}" type="datetimeFigureOut">
               <a:rPr kumimoji="1" lang="zh-CN" altLang="en-US" smtClean="0"/>
-              <a:t>2023/8/14</a:t>
+              <a:t>2023/12/6</a:t>
             </a:fld>
             <a:endParaRPr kumimoji="1" lang="zh-CN" altLang="en-US"/>
           </a:p>
@@ -1819,7 +1819,7 @@
           <a:p>
             <a:fld id="{6DC748ED-5CF5-CD4C-9FF2-B9B7ABFF9505}" type="datetimeFigureOut">
               <a:rPr kumimoji="1" lang="zh-CN" altLang="en-US" smtClean="0"/>
-              <a:t>2023/8/14</a:t>
+              <a:t>2023/12/6</a:t>
             </a:fld>
             <a:endParaRPr kumimoji="1" lang="zh-CN" altLang="en-US"/>
           </a:p>
@@ -1960,7 +1960,7 @@
           <a:p>
             <a:fld id="{6DC748ED-5CF5-CD4C-9FF2-B9B7ABFF9505}" type="datetimeFigureOut">
               <a:rPr kumimoji="1" lang="zh-CN" altLang="en-US" smtClean="0"/>
-              <a:t>2023/8/14</a:t>
+              <a:t>2023/12/6</a:t>
             </a:fld>
             <a:endParaRPr kumimoji="1" lang="zh-CN" altLang="en-US"/>
           </a:p>
@@ -2073,7 +2073,7 @@
           <a:p>
             <a:fld id="{6DC748ED-5CF5-CD4C-9FF2-B9B7ABFF9505}" type="datetimeFigureOut">
               <a:rPr kumimoji="1" lang="zh-CN" altLang="en-US" smtClean="0"/>
-              <a:t>2023/8/14</a:t>
+              <a:t>2023/12/6</a:t>
             </a:fld>
             <a:endParaRPr kumimoji="1" lang="zh-CN" altLang="en-US"/>
           </a:p>
@@ -2384,7 +2384,7 @@
           <a:p>
             <a:fld id="{6DC748ED-5CF5-CD4C-9FF2-B9B7ABFF9505}" type="datetimeFigureOut">
               <a:rPr kumimoji="1" lang="zh-CN" altLang="en-US" smtClean="0"/>
-              <a:t>2023/8/14</a:t>
+              <a:t>2023/12/6</a:t>
             </a:fld>
             <a:endParaRPr kumimoji="1" lang="zh-CN" altLang="en-US"/>
           </a:p>
@@ -2672,7 +2672,7 @@
           <a:p>
             <a:fld id="{6DC748ED-5CF5-CD4C-9FF2-B9B7ABFF9505}" type="datetimeFigureOut">
               <a:rPr kumimoji="1" lang="zh-CN" altLang="en-US" smtClean="0"/>
-              <a:t>2023/8/14</a:t>
+              <a:t>2023/12/6</a:t>
             </a:fld>
             <a:endParaRPr kumimoji="1" lang="zh-CN" altLang="en-US"/>
           </a:p>
@@ -2913,7 +2913,7 @@
           <a:p>
             <a:fld id="{6DC748ED-5CF5-CD4C-9FF2-B9B7ABFF9505}" type="datetimeFigureOut">
               <a:rPr kumimoji="1" lang="zh-CN" altLang="en-US" smtClean="0"/>
-              <a:t>2023/8/14</a:t>
+              <a:t>2023/12/6</a:t>
             </a:fld>
             <a:endParaRPr kumimoji="1" lang="zh-CN" altLang="en-US"/>
           </a:p>
@@ -3443,7 +3443,7 @@
                   <a:latin typeface="Arial" panose="020B0604020202020204" pitchFamily="34" charset="0"/>
                   <a:cs typeface="Arial" panose="020B0604020202020204" pitchFamily="34" charset="0"/>
                 </a:rPr>
-                <a:t>Prediction of Collision Cross-Section Values by Multimodal Graph Attention Network for Accurate Identification of Small Molecules</a:t>
+                <a:t>Accurate Prediction of Small Molecule Collision Cross-Section Values Through Chemical Class-Based Multimodal Graph Attention Network </a:t>
               </a:r>
             </a:p>
           </p:txBody>

</xml_diff>